<commit_message>
ISIS-2322 : staging changes to website
</commit_message>
<xml_diff>
--- a/content/refguide/latest/applib-svc/_images/reference-services/commands-and-events.pptx
+++ b/content/refguide/latest/applib-svc/_images/reference-services/commands-and-events.pptx
@@ -243,7 +243,7 @@
           <a:p>
             <a:fld id="{F855B3F0-BB84-4743-96EB-565470B6C0EB}" type="datetimeFigureOut">
               <a:rPr lang="en-GB" smtClean="0"/>
-              <a:t>21/02/2020</a:t>
+              <a:t>20/09/2020</a:t>
             </a:fld>
             <a:endParaRPr lang="en-GB"/>
           </a:p>
@@ -413,7 +413,7 @@
           <a:p>
             <a:fld id="{F855B3F0-BB84-4743-96EB-565470B6C0EB}" type="datetimeFigureOut">
               <a:rPr lang="en-GB" smtClean="0"/>
-              <a:t>21/02/2020</a:t>
+              <a:t>20/09/2020</a:t>
             </a:fld>
             <a:endParaRPr lang="en-GB"/>
           </a:p>
@@ -593,7 +593,7 @@
           <a:p>
             <a:fld id="{F855B3F0-BB84-4743-96EB-565470B6C0EB}" type="datetimeFigureOut">
               <a:rPr lang="en-GB" smtClean="0"/>
-              <a:t>21/02/2020</a:t>
+              <a:t>20/09/2020</a:t>
             </a:fld>
             <a:endParaRPr lang="en-GB"/>
           </a:p>
@@ -763,7 +763,7 @@
           <a:p>
             <a:fld id="{F855B3F0-BB84-4743-96EB-565470B6C0EB}" type="datetimeFigureOut">
               <a:rPr lang="en-GB" smtClean="0"/>
-              <a:t>21/02/2020</a:t>
+              <a:t>20/09/2020</a:t>
             </a:fld>
             <a:endParaRPr lang="en-GB"/>
           </a:p>
@@ -1009,7 +1009,7 @@
           <a:p>
             <a:fld id="{F855B3F0-BB84-4743-96EB-565470B6C0EB}" type="datetimeFigureOut">
               <a:rPr lang="en-GB" smtClean="0"/>
-              <a:t>21/02/2020</a:t>
+              <a:t>20/09/2020</a:t>
             </a:fld>
             <a:endParaRPr lang="en-GB"/>
           </a:p>
@@ -1241,7 +1241,7 @@
           <a:p>
             <a:fld id="{F855B3F0-BB84-4743-96EB-565470B6C0EB}" type="datetimeFigureOut">
               <a:rPr lang="en-GB" smtClean="0"/>
-              <a:t>21/02/2020</a:t>
+              <a:t>20/09/2020</a:t>
             </a:fld>
             <a:endParaRPr lang="en-GB"/>
           </a:p>
@@ -1608,7 +1608,7 @@
           <a:p>
             <a:fld id="{F855B3F0-BB84-4743-96EB-565470B6C0EB}" type="datetimeFigureOut">
               <a:rPr lang="en-GB" smtClean="0"/>
-              <a:t>21/02/2020</a:t>
+              <a:t>20/09/2020</a:t>
             </a:fld>
             <a:endParaRPr lang="en-GB"/>
           </a:p>
@@ -1726,7 +1726,7 @@
           <a:p>
             <a:fld id="{F855B3F0-BB84-4743-96EB-565470B6C0EB}" type="datetimeFigureOut">
               <a:rPr lang="en-GB" smtClean="0"/>
-              <a:t>21/02/2020</a:t>
+              <a:t>20/09/2020</a:t>
             </a:fld>
             <a:endParaRPr lang="en-GB"/>
           </a:p>
@@ -1821,7 +1821,7 @@
           <a:p>
             <a:fld id="{F855B3F0-BB84-4743-96EB-565470B6C0EB}" type="datetimeFigureOut">
               <a:rPr lang="en-GB" smtClean="0"/>
-              <a:t>21/02/2020</a:t>
+              <a:t>20/09/2020</a:t>
             </a:fld>
             <a:endParaRPr lang="en-GB"/>
           </a:p>
@@ -2098,7 +2098,7 @@
           <a:p>
             <a:fld id="{F855B3F0-BB84-4743-96EB-565470B6C0EB}" type="datetimeFigureOut">
               <a:rPr lang="en-GB" smtClean="0"/>
-              <a:t>21/02/2020</a:t>
+              <a:t>20/09/2020</a:t>
             </a:fld>
             <a:endParaRPr lang="en-GB"/>
           </a:p>
@@ -2355,7 +2355,7 @@
           <a:p>
             <a:fld id="{F855B3F0-BB84-4743-96EB-565470B6C0EB}" type="datetimeFigureOut">
               <a:rPr lang="en-GB" smtClean="0"/>
-              <a:t>21/02/2020</a:t>
+              <a:t>20/09/2020</a:t>
             </a:fld>
             <a:endParaRPr lang="en-GB"/>
           </a:p>
@@ -2568,7 +2568,7 @@
           <a:p>
             <a:fld id="{F855B3F0-BB84-4743-96EB-565470B6C0EB}" type="datetimeFigureOut">
               <a:rPr lang="en-GB" smtClean="0"/>
-              <a:t>21/02/2020</a:t>
+              <a:t>20/09/2020</a:t>
             </a:fld>
             <a:endParaRPr lang="en-GB"/>
           </a:p>
@@ -2981,7 +2981,7 @@
         </p:nvSpPr>
         <p:spPr>
           <a:xfrm>
-            <a:off x="8296353" y="3188643"/>
+            <a:off x="8191296" y="3795646"/>
             <a:ext cx="1649759" cy="550678"/>
           </a:xfrm>
           <a:prstGeom prst="rect">
@@ -3023,7 +3023,7 @@
         </p:nvSpPr>
         <p:spPr>
           <a:xfrm>
-            <a:off x="2002634" y="5145084"/>
+            <a:off x="2002634" y="5121738"/>
             <a:ext cx="3944691" cy="1048662"/>
           </a:xfrm>
           <a:prstGeom prst="rect">
@@ -3032,13 +3032,13 @@
         </p:spPr>
         <p:style>
           <a:lnRef idx="1">
-            <a:schemeClr val="accent3"/>
+            <a:schemeClr val="accent5"/>
           </a:lnRef>
           <a:fillRef idx="2">
-            <a:schemeClr val="accent3"/>
+            <a:schemeClr val="accent5"/>
           </a:fillRef>
           <a:effectRef idx="1">
-            <a:schemeClr val="accent3"/>
+            <a:schemeClr val="accent5"/>
           </a:effectRef>
           <a:fontRef idx="minor">
             <a:schemeClr val="dk1"/>
@@ -3073,8 +3073,8 @@
         </p:nvSpPr>
         <p:spPr>
           <a:xfrm>
-            <a:off x="2233446" y="1963584"/>
-            <a:ext cx="3569661" cy="2678962"/>
+            <a:off x="2233446" y="1871632"/>
+            <a:ext cx="3569661" cy="2607492"/>
           </a:xfrm>
           <a:prstGeom prst="rect">
             <a:avLst/>
@@ -3117,8 +3117,8 @@
         </p:nvSpPr>
         <p:spPr>
           <a:xfrm>
-            <a:off x="335440" y="1963584"/>
-            <a:ext cx="1408904" cy="2678962"/>
+            <a:off x="335440" y="1871632"/>
+            <a:ext cx="1408904" cy="2607491"/>
           </a:xfrm>
           <a:prstGeom prst="rect">
             <a:avLst/>
@@ -3186,7 +3186,7 @@
         </p:nvSpPr>
         <p:spPr>
           <a:xfrm>
-            <a:off x="2900657" y="2411922"/>
+            <a:off x="2900657" y="2248500"/>
             <a:ext cx="1116419" cy="2029047"/>
           </a:xfrm>
           <a:prstGeom prst="rect">
@@ -3262,7 +3262,7 @@
         </p:nvSpPr>
         <p:spPr>
           <a:xfrm>
-            <a:off x="2900655" y="5280943"/>
+            <a:off x="2900655" y="5257597"/>
             <a:ext cx="1116419" cy="522347"/>
           </a:xfrm>
           <a:prstGeom prst="rect">
@@ -3312,7 +3312,7 @@
         </p:nvSpPr>
         <p:spPr>
           <a:xfrm>
-            <a:off x="2013706" y="315219"/>
+            <a:off x="2013706" y="151797"/>
             <a:ext cx="3933616" cy="1005107"/>
           </a:xfrm>
           <a:prstGeom prst="rect">
@@ -3360,13 +3360,15 @@
       <p:cxnSp>
         <p:nvCxnSpPr>
           <p:cNvPr id="92" name="Straight Arrow Connector 91"/>
-          <p:cNvCxnSpPr/>
+          <p:cNvCxnSpPr>
+            <a:cxnSpLocks/>
+          </p:cNvCxnSpPr>
           <p:nvPr/>
         </p:nvCxnSpPr>
         <p:spPr>
           <a:xfrm flipH="1">
-            <a:off x="3047154" y="4413680"/>
-            <a:ext cx="2" cy="839974"/>
+            <a:off x="3031678" y="4250258"/>
+            <a:ext cx="15478" cy="1007339"/>
           </a:xfrm>
           <a:prstGeom prst="straightConnector1">
             <a:avLst/>
@@ -3404,7 +3406,7 @@
         </p:nvSpPr>
         <p:spPr>
           <a:xfrm>
-            <a:off x="2453183" y="684352"/>
+            <a:off x="2453183" y="520930"/>
             <a:ext cx="3178477" cy="467623"/>
           </a:xfrm>
           <a:prstGeom prst="rect">
@@ -3450,7 +3452,7 @@
         </p:nvCxnSpPr>
         <p:spPr>
           <a:xfrm flipH="1" flipV="1">
-            <a:off x="3458864" y="1173309"/>
+            <a:off x="3458864" y="1009887"/>
             <a:ext cx="3" cy="1238610"/>
           </a:xfrm>
           <a:prstGeom prst="straightConnector1">
@@ -3490,7 +3492,7 @@
         </p:nvSpPr>
         <p:spPr>
           <a:xfrm>
-            <a:off x="3453351" y="1298139"/>
+            <a:off x="3453351" y="1134717"/>
             <a:ext cx="2141933" cy="261610"/>
           </a:xfrm>
           <a:prstGeom prst="rect">
@@ -3523,7 +3525,7 @@
         </p:nvSpPr>
         <p:spPr>
           <a:xfrm>
-            <a:off x="2013708" y="1595876"/>
+            <a:off x="2013708" y="1432454"/>
             <a:ext cx="3933617" cy="3174087"/>
           </a:xfrm>
           <a:prstGeom prst="rect">
@@ -3575,7 +3577,7 @@
         </p:nvSpPr>
         <p:spPr>
           <a:xfrm>
-            <a:off x="6150645" y="2286384"/>
+            <a:off x="6150645" y="2741638"/>
             <a:ext cx="1696533" cy="600163"/>
           </a:xfrm>
           <a:prstGeom prst="rect">
@@ -3639,7 +3641,7 @@
         </p:nvSpPr>
         <p:spPr>
           <a:xfrm>
-            <a:off x="6150646" y="272748"/>
+            <a:off x="6150646" y="109326"/>
             <a:ext cx="1633864" cy="550678"/>
           </a:xfrm>
           <a:prstGeom prst="rect">
@@ -3703,7 +3705,7 @@
         </p:nvSpPr>
         <p:spPr>
           <a:xfrm>
-            <a:off x="8220733" y="3099063"/>
+            <a:off x="8115676" y="3706066"/>
             <a:ext cx="1649759" cy="550678"/>
           </a:xfrm>
           <a:prstGeom prst="rect">
@@ -3756,62 +3758,6 @@
           </a:p>
         </p:txBody>
       </p:sp>
-      <p:sp>
-        <p:nvSpPr>
-          <p:cNvPr id="103" name="Rectangle 102"/>
-          <p:cNvSpPr/>
-          <p:nvPr/>
-        </p:nvSpPr>
-        <p:spPr>
-          <a:xfrm>
-            <a:off x="197299" y="1595876"/>
-            <a:ext cx="1697674" cy="3174087"/>
-          </a:xfrm>
-          <a:prstGeom prst="rect">
-            <a:avLst/>
-          </a:prstGeom>
-          <a:noFill/>
-        </p:spPr>
-        <p:style>
-          <a:lnRef idx="2">
-            <a:schemeClr val="accent1">
-              <a:shade val="50000"/>
-            </a:schemeClr>
-          </a:lnRef>
-          <a:fillRef idx="1">
-            <a:schemeClr val="accent1"/>
-          </a:fillRef>
-          <a:effectRef idx="0">
-            <a:schemeClr val="accent1"/>
-          </a:effectRef>
-          <a:fontRef idx="minor">
-            <a:schemeClr val="lt1"/>
-          </a:fontRef>
-        </p:style>
-        <p:txBody>
-          <a:bodyPr rtlCol="0" anchor="t" anchorCtr="0"/>
-          <a:lstStyle/>
-          <a:p>
-            <a:r>
-              <a:rPr lang="en-GB" sz="1600" dirty="0" err="1">
-                <a:solidFill>
-                  <a:schemeClr val="bg1">
-                    <a:lumMod val="50000"/>
-                  </a:schemeClr>
-                </a:solidFill>
-              </a:rPr>
-              <a:t>CommandContext</a:t>
-            </a:r>
-            <a:endParaRPr lang="en-GB" sz="1600" dirty="0">
-              <a:solidFill>
-                <a:schemeClr val="bg1">
-                  <a:lumMod val="50000"/>
-                </a:schemeClr>
-              </a:solidFill>
-            </a:endParaRPr>
-          </a:p>
-        </p:txBody>
-      </p:sp>
       <p:cxnSp>
         <p:nvCxnSpPr>
           <p:cNvPr id="105" name="Curved Connector 104"/>
@@ -3822,9 +3768,9 @@
           <p:nvPr/>
         </p:nvCxnSpPr>
         <p:spPr>
-          <a:xfrm flipV="1">
-            <a:off x="4072207" y="2586466"/>
-            <a:ext cx="2078438" cy="128713"/>
+          <a:xfrm>
+            <a:off x="4072207" y="2428945"/>
+            <a:ext cx="2078438" cy="612775"/>
           </a:xfrm>
           <a:prstGeom prst="curvedConnector3">
             <a:avLst>
@@ -3861,14 +3807,13 @@
           <p:cNvPr id="107" name="Curved Connector 106"/>
           <p:cNvCxnSpPr>
             <a:cxnSpLocks/>
-            <a:endCxn id="100" idx="0"/>
           </p:cNvCxnSpPr>
           <p:nvPr/>
         </p:nvCxnSpPr>
         <p:spPr>
           <a:xfrm>
-            <a:off x="5627771" y="1336706"/>
-            <a:ext cx="1371141" cy="949678"/>
+            <a:off x="5631660" y="840344"/>
+            <a:ext cx="1367252" cy="1936313"/>
           </a:xfrm>
           <a:prstGeom prst="curvedConnector2">
             <a:avLst/>
@@ -3906,7 +3851,7 @@
         </p:nvSpPr>
         <p:spPr>
           <a:xfrm>
-            <a:off x="6049064" y="2946179"/>
+            <a:off x="6049064" y="3401433"/>
             <a:ext cx="1494320" cy="600164"/>
           </a:xfrm>
           <a:prstGeom prst="rect">
@@ -3966,7 +3911,7 @@
         </p:nvSpPr>
         <p:spPr>
           <a:xfrm>
-            <a:off x="6876315" y="1719173"/>
+            <a:off x="6965808" y="2178318"/>
             <a:ext cx="1721946" cy="430887"/>
           </a:xfrm>
           <a:prstGeom prst="rect">
@@ -4016,7 +3961,7 @@
         </p:nvCxnSpPr>
         <p:spPr>
           <a:xfrm flipV="1">
-            <a:off x="5631660" y="823426"/>
+            <a:off x="5631660" y="660004"/>
             <a:ext cx="1335918" cy="94738"/>
           </a:xfrm>
           <a:prstGeom prst="curvedConnector2">
@@ -4053,7 +3998,7 @@
         </p:nvSpPr>
         <p:spPr>
           <a:xfrm>
-            <a:off x="6530010" y="977600"/>
+            <a:off x="6530010" y="814178"/>
             <a:ext cx="1515158" cy="430887"/>
           </a:xfrm>
           <a:prstGeom prst="rect">
@@ -4101,21 +4046,21 @@
         </p:nvSpPr>
         <p:spPr>
           <a:xfrm>
-            <a:off x="197299" y="5643068"/>
-            <a:ext cx="1697676" cy="550678"/>
+            <a:off x="197299" y="4802608"/>
+            <a:ext cx="1697676" cy="325817"/>
           </a:xfrm>
           <a:prstGeom prst="rect">
             <a:avLst/>
           </a:prstGeom>
         </p:spPr>
         <p:style>
-          <a:lnRef idx="1">
+          <a:lnRef idx="2">
             <a:schemeClr val="accent3"/>
           </a:lnRef>
-          <a:fillRef idx="2">
-            <a:schemeClr val="accent3"/>
+          <a:fillRef idx="1">
+            <a:schemeClr val="lt1"/>
           </a:fillRef>
-          <a:effectRef idx="1">
+          <a:effectRef idx="0">
             <a:schemeClr val="accent3"/>
           </a:effectRef>
           <a:fontRef idx="minor">
@@ -4135,21 +4080,11 @@
               </a:rPr>
               <a:t>CommandService</a:t>
             </a:r>
-            <a:br>
-              <a:rPr lang="en-GB" sz="1600" dirty="0">
-                <a:solidFill>
-                  <a:schemeClr val="tx1"/>
-                </a:solidFill>
-              </a:rPr>
-            </a:br>
-            <a:r>
-              <a:rPr lang="en-GB" sz="1600" dirty="0">
-                <a:solidFill>
-                  <a:schemeClr val="tx1"/>
-                </a:solidFill>
-              </a:rPr>
-              <a:t>SPI</a:t>
-            </a:r>
+            <a:endParaRPr lang="en-GB" sz="1600" dirty="0">
+              <a:solidFill>
+                <a:schemeClr val="tx1"/>
+              </a:solidFill>
+            </a:endParaRPr>
           </a:p>
         </p:txBody>
       </p:sp>
@@ -4165,8 +4100,8 @@
         </p:nvCxnSpPr>
         <p:spPr>
           <a:xfrm>
-            <a:off x="7847178" y="2586466"/>
-            <a:ext cx="1198435" cy="512597"/>
+            <a:off x="7847178" y="3041720"/>
+            <a:ext cx="1093378" cy="664346"/>
           </a:xfrm>
           <a:prstGeom prst="curvedConnector2">
             <a:avLst/>
@@ -4200,6 +4135,7 @@
         <p:nvCxnSpPr>
           <p:cNvPr id="116" name="Curved Connector 115"/>
           <p:cNvCxnSpPr>
+            <a:cxnSpLocks/>
             <a:stCxn id="85" idx="2"/>
             <a:endCxn id="112" idx="0"/>
           </p:cNvCxnSpPr>
@@ -4207,8 +4143,8 @@
         </p:nvCxnSpPr>
         <p:spPr>
           <a:xfrm rot="16200000" flipH="1">
-            <a:off x="542753" y="5139684"/>
-            <a:ext cx="1000522" cy="6245"/>
+            <a:off x="881272" y="4637742"/>
+            <a:ext cx="323485" cy="6245"/>
           </a:xfrm>
           <a:prstGeom prst="curvedConnector3">
             <a:avLst>
@@ -4246,8 +4182,8 @@
         </p:nvSpPr>
         <p:spPr>
           <a:xfrm>
-            <a:off x="4042639" y="4756342"/>
-            <a:ext cx="1937924" cy="600164"/>
+            <a:off x="4038747" y="4592920"/>
+            <a:ext cx="1965163" cy="461665"/>
           </a:xfrm>
           <a:prstGeom prst="rect">
             <a:avLst/>
@@ -4262,55 +4198,17 @@
           <a:p>
             <a:pPr algn="ctr"/>
             <a:r>
-              <a:rPr lang="en-GB" sz="1100" dirty="0">
+              <a:rPr lang="en-GB" sz="1200" dirty="0">
                 <a:solidFill>
                   <a:schemeClr val="bg1">
                     <a:lumMod val="50000"/>
                   </a:schemeClr>
                 </a:solidFill>
               </a:rPr>
-              <a:t>Broadcast</a:t>
-            </a:r>
-            <a:br>
-              <a:rPr lang="en-GB" sz="1100" dirty="0">
-                <a:solidFill>
-                  <a:schemeClr val="bg1">
-                    <a:lumMod val="50000"/>
-                  </a:schemeClr>
-                </a:solidFill>
-              </a:rPr>
-            </a:br>
-            <a:r>
-              <a:rPr lang="en-GB" sz="1100" dirty="0">
-                <a:solidFill>
-                  <a:schemeClr val="bg1">
-                    <a:lumMod val="50000"/>
-                  </a:schemeClr>
-                </a:solidFill>
-              </a:rPr>
-              <a:t>pre- and post-</a:t>
-            </a:r>
-            <a:br>
-              <a:rPr lang="en-GB" sz="1100" dirty="0">
-                <a:solidFill>
-                  <a:schemeClr val="bg1">
-                    <a:lumMod val="50000"/>
-                  </a:schemeClr>
-                </a:solidFill>
-              </a:rPr>
-            </a:br>
-            <a:r>
-              <a:rPr lang="en-GB" sz="1100" dirty="0">
-                <a:solidFill>
-                  <a:schemeClr val="bg1">
-                    <a:lumMod val="50000"/>
-                  </a:schemeClr>
-                </a:solidFill>
-              </a:rPr>
-              <a:t>via </a:t>
-            </a:r>
-            <a:r>
-              <a:rPr lang="en-GB" sz="1100" dirty="0" err="1">
+              <a:t>Broadcast pre- and post- events through </a:t>
+            </a:r>
+            <a:r>
+              <a:rPr lang="en-GB" sz="1200" dirty="0" err="1">
                 <a:solidFill>
                   <a:schemeClr val="bg1">
                     <a:lumMod val="50000"/>
@@ -4319,7 +4217,7 @@
               </a:rPr>
               <a:t>EventBus</a:t>
             </a:r>
-            <a:endParaRPr lang="en-GB" sz="1100" dirty="0">
+            <a:endParaRPr lang="en-GB" sz="1200" dirty="0">
               <a:solidFill>
                 <a:schemeClr val="bg1">
                   <a:lumMod val="50000"/>
@@ -4337,8 +4235,8 @@
         </p:nvSpPr>
         <p:spPr>
           <a:xfrm>
-            <a:off x="187163" y="5175331"/>
-            <a:ext cx="840295" cy="430887"/>
+            <a:off x="202396" y="5148098"/>
+            <a:ext cx="809837" cy="430887"/>
           </a:xfrm>
           <a:prstGeom prst="rect">
             <a:avLst/>
@@ -4360,7 +4258,7 @@
                   </a:schemeClr>
                 </a:solidFill>
               </a:rPr>
-              <a:t>Command</a:t>
+              <a:t>at end of</a:t>
             </a:r>
             <a:br>
               <a:rPr lang="en-GB" sz="1100" dirty="0">
@@ -4379,7 +4277,7 @@
                   </a:schemeClr>
                 </a:solidFill>
               </a:rPr>
-              <a:t>persistence</a:t>
+              <a:t>interaction</a:t>
             </a:r>
           </a:p>
         </p:txBody>
@@ -4392,7 +4290,7 @@
         </p:nvSpPr>
         <p:spPr>
           <a:xfrm>
-            <a:off x="4604493" y="3701335"/>
+            <a:off x="4604493" y="3537913"/>
             <a:ext cx="1132106" cy="830997"/>
           </a:xfrm>
           <a:prstGeom prst="rect">
@@ -4438,13 +4336,15 @@
       <p:cxnSp>
         <p:nvCxnSpPr>
           <p:cNvPr id="120" name="Straight Arrow Connector 119"/>
-          <p:cNvCxnSpPr/>
+          <p:cNvCxnSpPr>
+            <a:cxnSpLocks/>
+          </p:cNvCxnSpPr>
           <p:nvPr/>
         </p:nvCxnSpPr>
         <p:spPr>
-          <a:xfrm flipH="1">
-            <a:off x="3925915" y="4442342"/>
-            <a:ext cx="2" cy="839974"/>
+          <a:xfrm>
+            <a:off x="3925917" y="4278920"/>
+            <a:ext cx="0" cy="978677"/>
           </a:xfrm>
           <a:prstGeom prst="straightConnector1">
             <a:avLst/>
@@ -4482,7 +4382,7 @@
         </p:nvSpPr>
         <p:spPr>
           <a:xfrm>
-            <a:off x="8296351" y="1035432"/>
+            <a:off x="8296351" y="872010"/>
             <a:ext cx="1649759" cy="550678"/>
           </a:xfrm>
           <a:prstGeom prst="rect">
@@ -4524,7 +4424,7 @@
         </p:nvSpPr>
         <p:spPr>
           <a:xfrm>
-            <a:off x="8220731" y="945852"/>
+            <a:off x="8220731" y="782430"/>
             <a:ext cx="1649759" cy="550678"/>
           </a:xfrm>
           <a:prstGeom prst="rect">
@@ -4589,7 +4489,7 @@
         </p:nvCxnSpPr>
         <p:spPr>
           <a:xfrm>
-            <a:off x="7784510" y="548087"/>
+            <a:off x="7784510" y="384665"/>
             <a:ext cx="1261101" cy="397765"/>
           </a:xfrm>
           <a:prstGeom prst="curvedConnector2">
@@ -4634,7 +4534,7 @@
         </p:nvSpPr>
         <p:spPr>
           <a:xfrm rot="5400000" flipV="1">
-            <a:off x="3855784" y="3130837"/>
+            <a:off x="3855784" y="2967415"/>
             <a:ext cx="1127200" cy="694354"/>
           </a:xfrm>
           <a:prstGeom prst="curvedUpArrow">
@@ -4669,6 +4569,385 @@
                 <a:schemeClr val="tx1"/>
               </a:solidFill>
             </a:endParaRPr>
+          </a:p>
+        </p:txBody>
+      </p:sp>
+      <p:cxnSp>
+        <p:nvCxnSpPr>
+          <p:cNvPr id="37" name="Straight Arrow Connector 36">
+            <a:extLst>
+              <a:ext uri="{FF2B5EF4-FFF2-40B4-BE49-F238E27FC236}">
+                <a16:creationId xmlns:a16="http://schemas.microsoft.com/office/drawing/2014/main" id="{4156A9D6-50E4-40EC-AE2B-D57C97BF658E}"/>
+              </a:ext>
+            </a:extLst>
+          </p:cNvPr>
+          <p:cNvCxnSpPr>
+            <a:cxnSpLocks/>
+            <a:stCxn id="84" idx="1"/>
+            <a:endCxn id="85" idx="3"/>
+          </p:cNvCxnSpPr>
+          <p:nvPr/>
+        </p:nvCxnSpPr>
+        <p:spPr>
+          <a:xfrm flipH="1">
+            <a:off x="1744344" y="3175378"/>
+            <a:ext cx="489102" cy="0"/>
+          </a:xfrm>
+          <a:prstGeom prst="straightConnector1">
+            <a:avLst/>
+          </a:prstGeom>
+          <a:ln>
+            <a:tailEnd type="triangle"/>
+          </a:ln>
+        </p:spPr>
+        <p:style>
+          <a:lnRef idx="1">
+            <a:schemeClr val="accent1"/>
+          </a:lnRef>
+          <a:fillRef idx="0">
+            <a:schemeClr val="accent1"/>
+          </a:fillRef>
+          <a:effectRef idx="0">
+            <a:schemeClr val="accent1"/>
+          </a:effectRef>
+          <a:fontRef idx="minor">
+            <a:schemeClr val="tx1"/>
+          </a:fontRef>
+        </p:style>
+      </p:cxnSp>
+      <p:sp>
+        <p:nvSpPr>
+          <p:cNvPr id="14" name="Rectangle 13">
+            <a:extLst>
+              <a:ext uri="{FF2B5EF4-FFF2-40B4-BE49-F238E27FC236}">
+                <a16:creationId xmlns:a16="http://schemas.microsoft.com/office/drawing/2014/main" id="{DDED4A49-54C2-42DE-BE04-12AB3B8A98BE}"/>
+              </a:ext>
+            </a:extLst>
+          </p:cNvPr>
+          <p:cNvSpPr/>
+          <p:nvPr/>
+        </p:nvSpPr>
+        <p:spPr>
+          <a:xfrm>
+            <a:off x="186277" y="5597025"/>
+            <a:ext cx="1697676" cy="550678"/>
+          </a:xfrm>
+          <a:prstGeom prst="rect">
+            <a:avLst/>
+          </a:prstGeom>
+        </p:spPr>
+        <p:style>
+          <a:lnRef idx="1">
+            <a:schemeClr val="accent3"/>
+          </a:lnRef>
+          <a:fillRef idx="2">
+            <a:schemeClr val="accent3"/>
+          </a:fillRef>
+          <a:effectRef idx="1">
+            <a:schemeClr val="accent3"/>
+          </a:effectRef>
+          <a:fontRef idx="minor">
+            <a:schemeClr val="dk1"/>
+          </a:fontRef>
+        </p:style>
+        <p:txBody>
+          <a:bodyPr rtlCol="0" anchor="t" anchorCtr="0"/>
+          <a:lstStyle/>
+          <a:p>
+            <a:pPr algn="ctr"/>
+            <a:r>
+              <a:rPr lang="en-GB" sz="1600" dirty="0" err="1">
+                <a:solidFill>
+                  <a:schemeClr val="tx1"/>
+                </a:solidFill>
+              </a:rPr>
+              <a:t>CommandServiceListener</a:t>
+            </a:r>
+            <a:r>
+              <a:rPr lang="en-GB" sz="1600" dirty="0">
+                <a:solidFill>
+                  <a:schemeClr val="tx1"/>
+                </a:solidFill>
+              </a:rPr>
+              <a:t> SPI</a:t>
+            </a:r>
+          </a:p>
+        </p:txBody>
+      </p:sp>
+      <p:cxnSp>
+        <p:nvCxnSpPr>
+          <p:cNvPr id="52" name="Curved Connector 115">
+            <a:extLst>
+              <a:ext uri="{FF2B5EF4-FFF2-40B4-BE49-F238E27FC236}">
+                <a16:creationId xmlns:a16="http://schemas.microsoft.com/office/drawing/2014/main" id="{2CFCB57E-F6DA-4BE8-921B-190A5DEA4EAB}"/>
+              </a:ext>
+            </a:extLst>
+          </p:cNvPr>
+          <p:cNvCxnSpPr>
+            <a:cxnSpLocks/>
+            <a:endCxn id="14" idx="0"/>
+          </p:cNvCxnSpPr>
+          <p:nvPr/>
+        </p:nvCxnSpPr>
+        <p:spPr>
+          <a:xfrm rot="5400000">
+            <a:off x="813042" y="5370174"/>
+            <a:ext cx="448925" cy="4777"/>
+          </a:xfrm>
+          <a:prstGeom prst="curvedConnector3">
+            <a:avLst>
+              <a:gd name="adj1" fmla="val 50000"/>
+            </a:avLst>
+          </a:prstGeom>
+          <a:ln w="19050">
+            <a:solidFill>
+              <a:schemeClr val="accent3"/>
+            </a:solidFill>
+            <a:prstDash val="sysDash"/>
+            <a:tailEnd type="triangle"/>
+          </a:ln>
+        </p:spPr>
+        <p:style>
+          <a:lnRef idx="1">
+            <a:schemeClr val="accent1"/>
+          </a:lnRef>
+          <a:fillRef idx="0">
+            <a:schemeClr val="accent1"/>
+          </a:fillRef>
+          <a:effectRef idx="0">
+            <a:schemeClr val="accent1"/>
+          </a:effectRef>
+          <a:fontRef idx="minor">
+            <a:schemeClr val="tx1"/>
+          </a:fontRef>
+        </p:style>
+      </p:cxnSp>
+      <p:sp>
+        <p:nvSpPr>
+          <p:cNvPr id="4" name="Rectangle 3">
+            <a:extLst>
+              <a:ext uri="{FF2B5EF4-FFF2-40B4-BE49-F238E27FC236}">
+                <a16:creationId xmlns:a16="http://schemas.microsoft.com/office/drawing/2014/main" id="{C2AA3929-84C4-4905-AAAA-1BA8D338E88D}"/>
+              </a:ext>
+            </a:extLst>
+          </p:cNvPr>
+          <p:cNvSpPr/>
+          <p:nvPr/>
+        </p:nvSpPr>
+        <p:spPr>
+          <a:xfrm>
+            <a:off x="324864" y="244401"/>
+            <a:ext cx="1408904" cy="1076553"/>
+          </a:xfrm>
+          <a:prstGeom prst="rect">
+            <a:avLst/>
+          </a:prstGeom>
+        </p:spPr>
+        <p:style>
+          <a:lnRef idx="1">
+            <a:schemeClr val="dk1"/>
+          </a:lnRef>
+          <a:fillRef idx="2">
+            <a:schemeClr val="dk1"/>
+          </a:fillRef>
+          <a:effectRef idx="1">
+            <a:schemeClr val="dk1"/>
+          </a:effectRef>
+          <a:fontRef idx="minor">
+            <a:schemeClr val="dk1"/>
+          </a:fontRef>
+        </p:style>
+        <p:txBody>
+          <a:bodyPr rtlCol="0" anchor="ctr"/>
+          <a:lstStyle/>
+          <a:p>
+            <a:pPr algn="ctr"/>
+            <a:r>
+              <a:rPr lang="en-GB" sz="1600" dirty="0">
+                <a:solidFill>
+                  <a:schemeClr val="bg1"/>
+                </a:solidFill>
+              </a:rPr>
+              <a:t>Child</a:t>
+            </a:r>
+            <a:br>
+              <a:rPr lang="en-GB" sz="1600" dirty="0">
+                <a:solidFill>
+                  <a:schemeClr val="bg1"/>
+                </a:solidFill>
+              </a:rPr>
+            </a:br>
+            <a:r>
+              <a:rPr lang="en-GB" sz="1600" dirty="0">
+                <a:solidFill>
+                  <a:schemeClr val="bg1"/>
+                </a:solidFill>
+              </a:rPr>
+              <a:t>Command</a:t>
+            </a:r>
+          </a:p>
+        </p:txBody>
+      </p:sp>
+      <p:cxnSp>
+        <p:nvCxnSpPr>
+          <p:cNvPr id="41" name="Curved Connector 115">
+            <a:extLst>
+              <a:ext uri="{FF2B5EF4-FFF2-40B4-BE49-F238E27FC236}">
+                <a16:creationId xmlns:a16="http://schemas.microsoft.com/office/drawing/2014/main" id="{A293974D-69FA-49B5-8C57-6F6BC3C1AB62}"/>
+              </a:ext>
+            </a:extLst>
+          </p:cNvPr>
+          <p:cNvCxnSpPr>
+            <a:cxnSpLocks/>
+          </p:cNvCxnSpPr>
+          <p:nvPr/>
+        </p:nvCxnSpPr>
+        <p:spPr>
+          <a:xfrm rot="16200000" flipH="1">
+            <a:off x="881272" y="4672761"/>
+            <a:ext cx="323485" cy="6245"/>
+          </a:xfrm>
+          <a:prstGeom prst="curvedConnector3">
+            <a:avLst>
+              <a:gd name="adj1" fmla="val 50000"/>
+            </a:avLst>
+          </a:prstGeom>
+          <a:ln w="19050">
+            <a:solidFill>
+              <a:schemeClr val="accent3"/>
+            </a:solidFill>
+            <a:prstDash val="sysDash"/>
+            <a:tailEnd type="triangle"/>
+          </a:ln>
+        </p:spPr>
+        <p:style>
+          <a:lnRef idx="1">
+            <a:schemeClr val="accent1"/>
+          </a:lnRef>
+          <a:fillRef idx="0">
+            <a:schemeClr val="accent1"/>
+          </a:fillRef>
+          <a:effectRef idx="0">
+            <a:schemeClr val="accent1"/>
+          </a:effectRef>
+          <a:fontRef idx="minor">
+            <a:schemeClr val="tx1"/>
+          </a:fontRef>
+        </p:style>
+      </p:cxnSp>
+      <p:cxnSp>
+        <p:nvCxnSpPr>
+          <p:cNvPr id="42" name="Curved Connector 115">
+            <a:extLst>
+              <a:ext uri="{FF2B5EF4-FFF2-40B4-BE49-F238E27FC236}">
+                <a16:creationId xmlns:a16="http://schemas.microsoft.com/office/drawing/2014/main" id="{05B315D6-2B4A-428D-B416-B75119683065}"/>
+              </a:ext>
+            </a:extLst>
+          </p:cNvPr>
+          <p:cNvCxnSpPr>
+            <a:cxnSpLocks/>
+            <a:stCxn id="85" idx="0"/>
+            <a:endCxn id="4" idx="2"/>
+          </p:cNvCxnSpPr>
+          <p:nvPr/>
+        </p:nvCxnSpPr>
+        <p:spPr>
+          <a:xfrm rot="16200000" flipV="1">
+            <a:off x="759265" y="1591005"/>
+            <a:ext cx="550678" cy="10576"/>
+          </a:xfrm>
+          <a:prstGeom prst="curvedConnector3">
+            <a:avLst>
+              <a:gd name="adj1" fmla="val 50000"/>
+            </a:avLst>
+          </a:prstGeom>
+          <a:ln w="19050">
+            <a:solidFill>
+              <a:schemeClr val="tx1">
+                <a:lumMod val="50000"/>
+                <a:lumOff val="50000"/>
+              </a:schemeClr>
+            </a:solidFill>
+            <a:prstDash val="dashDot"/>
+            <a:tailEnd type="triangle"/>
+          </a:ln>
+        </p:spPr>
+        <p:style>
+          <a:lnRef idx="1">
+            <a:schemeClr val="accent1"/>
+          </a:lnRef>
+          <a:fillRef idx="0">
+            <a:schemeClr val="accent1"/>
+          </a:fillRef>
+          <a:effectRef idx="0">
+            <a:schemeClr val="accent1"/>
+          </a:effectRef>
+          <a:fontRef idx="minor">
+            <a:schemeClr val="tx1"/>
+          </a:fontRef>
+        </p:style>
+      </p:cxnSp>
+      <p:sp>
+        <p:nvSpPr>
+          <p:cNvPr id="7" name="TextBox 6">
+            <a:extLst>
+              <a:ext uri="{FF2B5EF4-FFF2-40B4-BE49-F238E27FC236}">
+                <a16:creationId xmlns:a16="http://schemas.microsoft.com/office/drawing/2014/main" id="{395A129D-08CA-4968-92A8-61E2392BFFE4}"/>
+              </a:ext>
+            </a:extLst>
+          </p:cNvPr>
+          <p:cNvSpPr txBox="1"/>
+          <p:nvPr/>
+        </p:nvSpPr>
+        <p:spPr>
+          <a:xfrm>
+            <a:off x="375186" y="1330813"/>
+            <a:ext cx="745718" cy="430887"/>
+          </a:xfrm>
+          <a:prstGeom prst="rect">
+            <a:avLst/>
+          </a:prstGeom>
+          <a:noFill/>
+        </p:spPr>
+        <p:txBody>
+          <a:bodyPr wrap="none" rtlCol="0">
+            <a:spAutoFit/>
+          </a:bodyPr>
+          <a:lstStyle/>
+          <a:p>
+            <a:pPr algn="ctr"/>
+            <a:r>
+              <a:rPr lang="en-GB" sz="1100" dirty="0">
+                <a:solidFill>
+                  <a:schemeClr val="tx1">
+                    <a:lumMod val="85000"/>
+                    <a:lumOff val="15000"/>
+                  </a:schemeClr>
+                </a:solidFill>
+              </a:rPr>
+              <a:t>async</a:t>
+            </a:r>
+            <a:br>
+              <a:rPr lang="en-GB" sz="1100" dirty="0">
+                <a:solidFill>
+                  <a:schemeClr val="tx1">
+                    <a:lumMod val="85000"/>
+                    <a:lumOff val="15000"/>
+                  </a:schemeClr>
+                </a:solidFill>
+              </a:rPr>
+            </a:br>
+            <a:r>
+              <a:rPr lang="en-GB" sz="1100" dirty="0">
+                <a:solidFill>
+                  <a:schemeClr val="tx1">
+                    <a:lumMod val="85000"/>
+                    <a:lumOff val="15000"/>
+                  </a:schemeClr>
+                </a:solidFill>
+              </a:rPr>
+              <a:t>execution</a:t>
+            </a:r>
           </a:p>
         </p:txBody>
       </p:sp>

</xml_diff>